<commit_message>
Dummy and Harmony servers
</commit_message>
<xml_diff>
--- a/Storage/App_Data/Books/Solace.pptx
+++ b/Storage/App_Data/Books/Solace.pptx
@@ -3262,7 +3262,7 @@
         <p:spPr>
           <a:xfrm rot="0">
             <a:off x="635000" y="635000"/>
-            <a:ext cx="12700000" cy="635000"/>
+            <a:ext cx="7620000" cy="635000"/>
           </a:xfrm>
           <a:prstGeom prst="rect">
             <a:avLst/>
@@ -3303,7 +3303,7 @@
         <p:spPr>
           <a:xfrm rot="0">
             <a:off x="635000" y="1270000"/>
-            <a:ext cx="12700000" cy="635000"/>
+            <a:ext cx="7620000" cy="635000"/>
           </a:xfrm>
           <a:prstGeom prst="rect">
             <a:avLst/>
@@ -3344,7 +3344,7 @@
         <p:spPr>
           <a:xfrm rot="0">
             <a:off x="635000" y="1905000"/>
-            <a:ext cx="12700000" cy="635000"/>
+            <a:ext cx="7620000" cy="635000"/>
           </a:xfrm>
           <a:prstGeom prst="rect">
             <a:avLst/>
@@ -3385,7 +3385,7 @@
         <p:spPr>
           <a:xfrm rot="0">
             <a:off x="635000" y="2540000"/>
-            <a:ext cx="12700000" cy="635000"/>
+            <a:ext cx="7620000" cy="635000"/>
           </a:xfrm>
           <a:prstGeom prst="rect">
             <a:avLst/>
@@ -3426,7 +3426,7 @@
         <p:spPr>
           <a:xfrm rot="0">
             <a:off x="635000" y="3175000"/>
-            <a:ext cx="12700000" cy="635000"/>
+            <a:ext cx="7620000" cy="635000"/>
           </a:xfrm>
           <a:prstGeom prst="rect">
             <a:avLst/>
@@ -3493,7 +3493,7 @@
         <p:spPr>
           <a:xfrm rot="0">
             <a:off x="635000" y="635000"/>
-            <a:ext cx="12700000" cy="635000"/>
+            <a:ext cx="7620000" cy="635000"/>
           </a:xfrm>
           <a:prstGeom prst="rect">
             <a:avLst/>
@@ -3534,7 +3534,7 @@
         <p:spPr>
           <a:xfrm rot="0">
             <a:off x="635000" y="1270000"/>
-            <a:ext cx="12700000" cy="635000"/>
+            <a:ext cx="7620000" cy="635000"/>
           </a:xfrm>
           <a:prstGeom prst="rect">
             <a:avLst/>
@@ -3575,7 +3575,7 @@
         <p:spPr>
           <a:xfrm rot="0">
             <a:off x="635000" y="1905000"/>
-            <a:ext cx="12700000" cy="635000"/>
+            <a:ext cx="7620000" cy="635000"/>
           </a:xfrm>
           <a:prstGeom prst="rect">
             <a:avLst/>
@@ -3616,7 +3616,7 @@
         <p:spPr>
           <a:xfrm rot="0">
             <a:off x="635000" y="2540000"/>
-            <a:ext cx="12700000" cy="635000"/>
+            <a:ext cx="7620000" cy="635000"/>
           </a:xfrm>
           <a:prstGeom prst="rect">
             <a:avLst/>

</xml_diff>

<commit_message>
nimbus2.0 dont like it at all
</commit_message>
<xml_diff>
--- a/Storage/App_Data/Books/Solace.pptx
+++ b/Storage/App_Data/Books/Solace.pptx
@@ -7,6 +7,7 @@
   <p:sldIdLst>
     <p:sldId id="256" r:id="rId6"/>
     <p:sldId id="257" r:id="rId7"/>
+    <p:sldId id="258" r:id="rId8"/>
   </p:sldIdLst>
   <p:sldSz cx="12192000" cy="6858000" type="custom"/>
   <p:notesSz cx="6858000" cy="9144000"/>
@@ -3323,12 +3324,12 @@
             <a:r>
               <a:rPr sz="1800" b="0" i="0" dirty="0">
                 <a:solidFill>
-                  <a:srgbClr val="F45805">
+                  <a:srgbClr val="D07886">
                     <a:alpha val="100000"/>
                   </a:srgbClr>
                 </a:solidFill>
               </a:rPr>
-              <a:t>Id: 368</a:t>
+              <a:t>Id: 412</a:t>
             </a:r>
           </a:p>
         </p:txBody>
@@ -3410,7 +3411,7 @@
                   </a:srgbClr>
                 </a:solidFill>
               </a:rPr>
-              <a:t>Description: This is the King in black comic</a:t>
+              <a:t>Description: This is King In Black</a:t>
             </a:r>
           </a:p>
         </p:txBody>
@@ -3452,7 +3453,7 @@
                 </a:solidFill>
                 <a:hlinkClick r:id="rId2" action="ppaction://hlinkfile"/>
               </a:rPr>
-              <a:t>ImageUrl: https://birkhauser.com/product-not-found.png</a:t>
+              <a:t>ImageUrl: https://colorless-shrimp-958.convex.cloud/api/storage/bc963ec4-0ad1-4ef3-8ed2-20c670e2359f</a:t>
             </a:r>
           </a:p>
         </p:txBody>
@@ -3554,12 +3555,12 @@
             <a:r>
               <a:rPr sz="1800" b="0" i="0" dirty="0">
                 <a:solidFill>
-                  <a:srgbClr val="F45805">
+                  <a:srgbClr val="D07886">
                     <a:alpha val="100000"/>
                   </a:srgbClr>
                 </a:solidFill>
               </a:rPr>
-              <a:t>Book Id: 368</a:t>
+              <a:t>Book Id: 412</a:t>
             </a:r>
           </a:p>
         </p:txBody>
@@ -3600,7 +3601,7 @@
                   </a:srgbClr>
                 </a:solidFill>
               </a:rPr>
-              <a:t>Title: varius sollicitudin</a:t>
+              <a:t>Title: First chapter of king in black</a:t>
             </a:r>
           </a:p>
         </p:txBody>
@@ -3641,7 +3642,196 @@
                   </a:srgbClr>
                 </a:solidFill>
               </a:rPr>
-              <a:t>Content: Donec vel augue felis</a:t>
+              <a:t>Content: THIS IS KING IN BLACK</a:t>
+            </a:r>
+          </a:p>
+        </p:txBody>
+      </p:sp>
+    </p:spTree>
+  </p:cSld>
+  <p:clrMapOvr>
+    <a:masterClrMapping/>
+  </p:clrMapOvr>
+</p:sld>
+</file>
+
+<file path=ppt/slides/slide3.xml><?xml version="1.0" encoding="utf-8"?>
+<p:sld xmlns:a="http://schemas.openxmlformats.org/drawingml/2006/main" xmlns:r="http://schemas.openxmlformats.org/officeDocument/2006/relationships" xmlns:p="http://schemas.openxmlformats.org/presentationml/2006/main">
+  <p:cSld>
+    <p:spTree>
+      <p:nvGrpSpPr>
+        <p:cNvPr id="1" name=""/>
+        <p:cNvGrpSpPr/>
+        <p:nvPr/>
+      </p:nvGrpSpPr>
+      <p:grpSpPr>
+        <a:xfrm>
+          <a:off x="0" y="0"/>
+          <a:ext cx="0" cy="0"/>
+          <a:chOff x="0" y="0"/>
+          <a:chExt cx="0" cy="0"/>
+        </a:xfrm>
+      </p:grpSpPr>
+      <p:sp>
+        <p:nvSpPr>
+          <p:cNvPr id="2" name="TextBox2"/>
+          <p:cNvSpPr txBox="1">
+            <a:spLocks noChangeArrowheads="1"/>
+          </p:cNvSpPr>
+          <p:nvPr/>
+        </p:nvSpPr>
+        <p:spPr>
+          <a:xfrm rot="0">
+            <a:off x="635000" y="635000"/>
+            <a:ext cx="7620000" cy="635000"/>
+          </a:xfrm>
+          <a:prstGeom prst="rect">
+            <a:avLst/>
+          </a:prstGeom>
+          <a:ln>
+            <a:headEnd type="none"/>
+            <a:tailEnd type="none"/>
+          </a:ln>
+        </p:spPr>
+        <p:txBody>
+          <a:bodyPr wrap="square">
+            <a:spAutoFit/>
+          </a:bodyPr>
+          <a:lstStyle/>
+          <a:p>
+            <a:pPr defTabSz="914400"/>
+            <a:r>
+              <a:rPr sz="2800" b="1" i="0" dirty="0">
+                <a:solidFill>
+                  <a:srgbClr val="000000">
+                    <a:alpha val="100000"/>
+                  </a:srgbClr>
+                </a:solidFill>
+              </a:rPr>
+              <a:t>Chapter: 0</a:t>
+            </a:r>
+          </a:p>
+        </p:txBody>
+      </p:sp>
+      <p:sp>
+        <p:nvSpPr>
+          <p:cNvPr id="3" name="TextBox3"/>
+          <p:cNvSpPr txBox="1">
+            <a:spLocks noChangeArrowheads="1"/>
+          </p:cNvSpPr>
+          <p:nvPr/>
+        </p:nvSpPr>
+        <p:spPr>
+          <a:xfrm rot="0">
+            <a:off x="635000" y="1270000"/>
+            <a:ext cx="7620000" cy="635000"/>
+          </a:xfrm>
+          <a:prstGeom prst="rect">
+            <a:avLst/>
+          </a:prstGeom>
+          <a:ln>
+            <a:headEnd type="none"/>
+            <a:tailEnd type="none"/>
+          </a:ln>
+        </p:spPr>
+        <p:txBody>
+          <a:bodyPr wrap="square">
+            <a:spAutoFit/>
+          </a:bodyPr>
+          <a:lstStyle/>
+          <a:p>
+            <a:pPr defTabSz="914400"/>
+            <a:r>
+              <a:rPr sz="1800" b="0" i="0" dirty="0">
+                <a:solidFill>
+                  <a:srgbClr val="D07886">
+                    <a:alpha val="100000"/>
+                  </a:srgbClr>
+                </a:solidFill>
+              </a:rPr>
+              <a:t>Book Id: 412</a:t>
+            </a:r>
+          </a:p>
+        </p:txBody>
+      </p:sp>
+      <p:sp>
+        <p:nvSpPr>
+          <p:cNvPr id="4" name="TextBox4"/>
+          <p:cNvSpPr txBox="1">
+            <a:spLocks noChangeArrowheads="1"/>
+          </p:cNvSpPr>
+          <p:nvPr/>
+        </p:nvSpPr>
+        <p:spPr>
+          <a:xfrm rot="0">
+            <a:off x="635000" y="1905000"/>
+            <a:ext cx="7620000" cy="635000"/>
+          </a:xfrm>
+          <a:prstGeom prst="rect">
+            <a:avLst/>
+          </a:prstGeom>
+          <a:ln>
+            <a:headEnd type="none"/>
+            <a:tailEnd type="none"/>
+          </a:ln>
+        </p:spPr>
+        <p:txBody>
+          <a:bodyPr wrap="square">
+            <a:spAutoFit/>
+          </a:bodyPr>
+          <a:lstStyle/>
+          <a:p>
+            <a:pPr defTabSz="914400"/>
+            <a:r>
+              <a:rPr sz="2400" b="1" i="0" dirty="0">
+                <a:solidFill>
+                  <a:srgbClr val="000000">
+                    <a:alpha val="100000"/>
+                  </a:srgbClr>
+                </a:solidFill>
+              </a:rPr>
+              <a:t>Title: Second chapter of king in black</a:t>
+            </a:r>
+          </a:p>
+        </p:txBody>
+      </p:sp>
+      <p:sp>
+        <p:nvSpPr>
+          <p:cNvPr id="5" name="TextBox5"/>
+          <p:cNvSpPr txBox="1">
+            <a:spLocks noChangeArrowheads="1"/>
+          </p:cNvSpPr>
+          <p:nvPr/>
+        </p:nvSpPr>
+        <p:spPr>
+          <a:xfrm rot="0">
+            <a:off x="635000" y="2540000"/>
+            <a:ext cx="7620000" cy="635000"/>
+          </a:xfrm>
+          <a:prstGeom prst="rect">
+            <a:avLst/>
+          </a:prstGeom>
+          <a:ln>
+            <a:headEnd type="none"/>
+            <a:tailEnd type="none"/>
+          </a:ln>
+        </p:spPr>
+        <p:txBody>
+          <a:bodyPr wrap="square">
+            <a:spAutoFit/>
+          </a:bodyPr>
+          <a:lstStyle/>
+          <a:p>
+            <a:pPr defTabSz="914400"/>
+            <a:r>
+              <a:rPr sz="1800" b="0" i="0" dirty="0">
+                <a:solidFill>
+                  <a:srgbClr val="000000">
+                    <a:alpha val="100000"/>
+                  </a:srgbClr>
+                </a:solidFill>
+              </a:rPr>
+              <a:t>Content: THIS IS KING IN BLACK</a:t>
             </a:r>
           </a:p>
         </p:txBody>

</xml_diff>

<commit_message>
Fixing cascade and input validation
</commit_message>
<xml_diff>
--- a/Storage/App_Data/Books/Solace.pptx
+++ b/Storage/App_Data/Books/Solace.pptx
@@ -5,16 +5,16 @@
     <p:sldMasterId id="2147483648" r:id="rId1"/>
   </p:sldMasterIdLst>
   <p:sldIdLst>
-    <p:sldId id="256" r:id="rId6"/>
-    <p:sldId id="257" r:id="rId7"/>
+    <p:sldId id="256" r:id="rId2"/>
+    <p:sldId id="257" r:id="rId3"/>
   </p:sldIdLst>
-  <p:sldSz cx="12192000" cy="6858000" type="custom"/>
+  <p:sldSz cx="12192000" cy="6858000"/>
   <p:notesSz cx="6858000" cy="9144000"/>
   <p:defaultTextStyle>
     <a:defPPr defTabSz="914400">
       <a:defRPr lang="en-US" dirty="0"/>
     </a:defPPr>
-    <a:lvl1pPr marL="0" rtl="0" algn="l" defTabSz="914400">
+    <a:lvl1pPr marL="0" algn="l" defTabSz="914400" rtl="0">
       <a:defRPr sz="1800" kern="1200" dirty="0">
         <a:solidFill>
           <a:schemeClr val="tx1"/>
@@ -24,7 +24,7 @@
         <a:cs typeface="+mn-cs"/>
       </a:defRPr>
     </a:lvl1pPr>
-    <a:lvl2pPr marL="457200" rtl="0" algn="l" defTabSz="914400">
+    <a:lvl2pPr marL="457200" algn="l" defTabSz="914400" rtl="0">
       <a:defRPr sz="1800" kern="1200" dirty="0">
         <a:solidFill>
           <a:schemeClr val="tx1"/>
@@ -34,7 +34,7 @@
         <a:cs typeface="+mn-cs"/>
       </a:defRPr>
     </a:lvl2pPr>
-    <a:lvl3pPr marL="914400" rtl="0" algn="l" defTabSz="914400">
+    <a:lvl3pPr marL="914400" algn="l" defTabSz="914400" rtl="0">
       <a:defRPr sz="1800" kern="1200" dirty="0">
         <a:solidFill>
           <a:schemeClr val="tx1"/>
@@ -44,7 +44,7 @@
         <a:cs typeface="+mn-cs"/>
       </a:defRPr>
     </a:lvl3pPr>
-    <a:lvl4pPr marL="1371600" rtl="0" algn="l" defTabSz="914400">
+    <a:lvl4pPr marL="1371600" algn="l" defTabSz="914400" rtl="0">
       <a:defRPr sz="1800" kern="1200" dirty="0">
         <a:solidFill>
           <a:schemeClr val="tx1"/>
@@ -54,7 +54,7 @@
         <a:cs typeface="+mn-cs"/>
       </a:defRPr>
     </a:lvl4pPr>
-    <a:lvl5pPr marL="1828800" rtl="0" algn="l" defTabSz="914400">
+    <a:lvl5pPr marL="1828800" algn="l" defTabSz="914400" rtl="0">
       <a:defRPr sz="1800" kern="1200" dirty="0">
         <a:solidFill>
           <a:schemeClr val="tx1"/>
@@ -64,7 +64,7 @@
         <a:cs typeface="+mn-cs"/>
       </a:defRPr>
     </a:lvl5pPr>
-    <a:lvl6pPr marL="2286000" rtl="0" algn="l" defTabSz="914400">
+    <a:lvl6pPr marL="2286000" algn="l" defTabSz="914400" rtl="0">
       <a:defRPr sz="1800" kern="1200" dirty="0">
         <a:solidFill>
           <a:schemeClr val="tx1"/>
@@ -74,7 +74,7 @@
         <a:cs typeface="+mn-cs"/>
       </a:defRPr>
     </a:lvl6pPr>
-    <a:lvl7pPr marL="2743200" rtl="0" algn="l" defTabSz="914400">
+    <a:lvl7pPr marL="2743200" algn="l" defTabSz="914400" rtl="0">
       <a:defRPr sz="1800" kern="1200" dirty="0">
         <a:solidFill>
           <a:schemeClr val="tx1"/>
@@ -84,7 +84,7 @@
         <a:cs typeface="+mn-cs"/>
       </a:defRPr>
     </a:lvl7pPr>
-    <a:lvl8pPr marL="3200400" rtl="0" algn="l" defTabSz="914400">
+    <a:lvl8pPr marL="3200400" algn="l" defTabSz="914400" rtl="0">
       <a:defRPr sz="1800" kern="1200" dirty="0">
         <a:solidFill>
           <a:schemeClr val="tx1"/>
@@ -94,7 +94,7 @@
         <a:cs typeface="+mn-cs"/>
       </a:defRPr>
     </a:lvl8pPr>
-    <a:lvl9pPr marL="3657600" rtl="0" algn="l" defTabSz="914400">
+    <a:lvl9pPr marL="3657600" algn="l" defTabSz="914400" rtl="0">
       <a:defRPr sz="1800" kern="1200" dirty="0">
         <a:solidFill>
           <a:schemeClr val="tx1"/>
@@ -105,11 +105,12 @@
       </a:defRPr>
     </a:lvl9pPr>
   </p:defaultTextStyle>
+  <p:extLst>
+    <p:ext uri="{EFAFB233-063F-42B5-8137-9DF3F51BA10A}">
+      <p15:sldGuideLst xmlns:p15="http://schemas.microsoft.com/office/powerpoint/2012/main"/>
+    </p:ext>
+  </p:extLst>
 </p:presentation>
-</file>
-
-<file path=ppt/commentAuthors.xml><?xml version="1.0" encoding="utf-8"?>
-<p:cmAuthorLst xmlns:a="http://schemas.openxmlformats.org/drawingml/2006/main" xmlns:r="http://schemas.openxmlformats.org/officeDocument/2006/relationships" xmlns:p="http://schemas.openxmlformats.org/presentationml/2006/main"/>
 </file>
 
 <file path=ppt/slideLayouts/slideLayout1.xml><?xml version="1.0" encoding="utf-8"?>
@@ -150,19 +151,17 @@
           </a:ln>
         </p:spPr>
         <p:txBody>
-          <a:bodyPr anchor="b" wrap="square"/>
+          <a:bodyPr wrap="square" anchor="b"/>
           <a:lstStyle>
             <a:lvl1pPr algn="ctr">
               <a:defRPr sz="6000" dirty="0"/>
             </a:lvl1pPr>
           </a:lstStyle>
           <a:p>
-            <a:pPr/>
             <a:r>
               <a:rPr lang="en-US" dirty="0"/>
               <a:t>Click to edit Master title style</a:t>
             </a:r>
-            <a:endParaRPr lang="en-US" dirty="0"/>
           </a:p>
         </p:txBody>
       </p:sp>
@@ -227,12 +226,10 @@
             </a:lvl9pPr>
           </a:lstStyle>
           <a:p>
-            <a:pPr/>
             <a:r>
               <a:rPr lang="en-US" dirty="0"/>
               <a:t>Click to edit Master subtitle style</a:t>
             </a:r>
-            <a:endParaRPr lang="en-US" dirty="0"/>
           </a:p>
         </p:txBody>
       </p:sp>
@@ -256,10 +253,9 @@
           <a:bodyPr wrap="square"/>
           <a:lstStyle/>
           <a:p>
-            <a:pPr/>
             <a:fld id="{D4630D1D-EC81-4D12-BBAE-7AD5C46FE905}" type="datetimeFigureOut">
               <a:rPr lang="en-US" dirty="0"/>
-              <a:t>7/8/2015</a:t>
+              <a:t>11/24/2024</a:t>
             </a:fld>
             <a:endParaRPr lang="en-US" dirty="0"/>
           </a:p>
@@ -285,7 +281,6 @@
           <a:bodyPr wrap="square"/>
           <a:lstStyle/>
           <a:p>
-            <a:pPr/>
             <a:endParaRPr lang="en-US" dirty="0"/>
           </a:p>
         </p:txBody>
@@ -310,7 +305,6 @@
           <a:bodyPr wrap="square"/>
           <a:lstStyle/>
           <a:p>
-            <a:pPr/>
             <a:fld id="{E1CC4C9C-B29E-4E68-9F89-CA7A1621DE94}" type="slidenum">
               <a:rPr lang="en-US" dirty="0"/>
               <a:t>‹#›</a:t>
@@ -364,12 +358,10 @@
           <a:bodyPr wrap="square"/>
           <a:lstStyle/>
           <a:p>
-            <a:pPr/>
             <a:r>
               <a:rPr lang="en-US" dirty="0"/>
               <a:t>Click to edit Master title style</a:t>
             </a:r>
-            <a:endParaRPr lang="en-US" dirty="0"/>
           </a:p>
         </p:txBody>
       </p:sp>
@@ -393,7 +385,6 @@
           <a:bodyPr vert="eaVert" wrap="square"/>
           <a:lstStyle/>
           <a:p>
-            <a:pPr/>
             <a:r>
               <a:rPr lang="en-US" dirty="0"/>
               <a:t>Click to edit Master text styles</a:t>
@@ -426,7 +417,6 @@
               <a:rPr lang="en-US" dirty="0"/>
               <a:t>Fifth level</a:t>
             </a:r>
-            <a:endParaRPr lang="en-US" dirty="0"/>
           </a:p>
         </p:txBody>
       </p:sp>
@@ -450,10 +440,9 @@
           <a:bodyPr wrap="square"/>
           <a:lstStyle/>
           <a:p>
-            <a:pPr/>
             <a:fld id="{D4630D1D-EC81-4D12-BBAE-7AD5C46FE905}" type="datetimeFigureOut">
               <a:rPr lang="en-US" dirty="0"/>
-              <a:t>7/8/2015</a:t>
+              <a:t>11/24/2024</a:t>
             </a:fld>
             <a:endParaRPr lang="en-US" dirty="0"/>
           </a:p>
@@ -479,7 +468,6 @@
           <a:bodyPr wrap="square"/>
           <a:lstStyle/>
           <a:p>
-            <a:pPr/>
             <a:endParaRPr lang="en-US" dirty="0"/>
           </a:p>
         </p:txBody>
@@ -504,7 +492,6 @@
           <a:bodyPr wrap="square"/>
           <a:lstStyle/>
           <a:p>
-            <a:pPr/>
             <a:fld id="{E1CC4C9C-B29E-4E68-9F89-CA7A1621DE94}" type="slidenum">
               <a:rPr lang="en-US" dirty="0"/>
               <a:t>‹#›</a:t>
@@ -562,12 +549,10 @@
           <a:bodyPr vert="eaVert" wrap="square"/>
           <a:lstStyle/>
           <a:p>
-            <a:pPr/>
             <a:r>
               <a:rPr lang="en-US" dirty="0"/>
               <a:t>Click to edit Master title style</a:t>
             </a:r>
-            <a:endParaRPr lang="en-US" dirty="0"/>
           </a:p>
         </p:txBody>
       </p:sp>
@@ -595,7 +580,6 @@
           <a:bodyPr vert="eaVert" wrap="square"/>
           <a:lstStyle/>
           <a:p>
-            <a:pPr/>
             <a:r>
               <a:rPr lang="en-US" dirty="0"/>
               <a:t>Click to edit Master text styles</a:t>
@@ -628,7 +612,6 @@
               <a:rPr lang="en-US" dirty="0"/>
               <a:t>Fifth level</a:t>
             </a:r>
-            <a:endParaRPr lang="en-US" dirty="0"/>
           </a:p>
         </p:txBody>
       </p:sp>
@@ -652,10 +635,9 @@
           <a:bodyPr wrap="square"/>
           <a:lstStyle/>
           <a:p>
-            <a:pPr/>
             <a:fld id="{D4630D1D-EC81-4D12-BBAE-7AD5C46FE905}" type="datetimeFigureOut">
               <a:rPr lang="en-US" dirty="0"/>
-              <a:t>7/8/2015</a:t>
+              <a:t>11/24/2024</a:t>
             </a:fld>
             <a:endParaRPr lang="en-US" dirty="0"/>
           </a:p>
@@ -681,7 +663,6 @@
           <a:bodyPr wrap="square"/>
           <a:lstStyle/>
           <a:p>
-            <a:pPr/>
             <a:endParaRPr lang="en-US" dirty="0"/>
           </a:p>
         </p:txBody>
@@ -706,7 +687,6 @@
           <a:bodyPr wrap="square"/>
           <a:lstStyle/>
           <a:p>
-            <a:pPr/>
             <a:fld id="{E1CC4C9C-B29E-4E68-9F89-CA7A1621DE94}" type="slidenum">
               <a:rPr lang="en-US" dirty="0"/>
               <a:t>‹#›</a:t>
@@ -760,12 +740,10 @@
           <a:bodyPr wrap="square"/>
           <a:lstStyle/>
           <a:p>
-            <a:pPr/>
             <a:r>
               <a:rPr lang="en-US" dirty="0"/>
               <a:t>Click to edit Master title style</a:t>
             </a:r>
-            <a:endParaRPr lang="en-US" dirty="0"/>
           </a:p>
         </p:txBody>
       </p:sp>
@@ -789,7 +767,6 @@
           <a:bodyPr wrap="square"/>
           <a:lstStyle/>
           <a:p>
-            <a:pPr/>
             <a:r>
               <a:rPr lang="en-US" dirty="0"/>
               <a:t>Click to edit Master text styles</a:t>
@@ -822,7 +799,6 @@
               <a:rPr lang="en-US" dirty="0"/>
               <a:t>Fifth level</a:t>
             </a:r>
-            <a:endParaRPr lang="en-US" dirty="0"/>
           </a:p>
         </p:txBody>
       </p:sp>
@@ -846,10 +822,9 @@
           <a:bodyPr wrap="square"/>
           <a:lstStyle/>
           <a:p>
-            <a:pPr/>
             <a:fld id="{D4630D1D-EC81-4D12-BBAE-7AD5C46FE905}" type="datetimeFigureOut">
               <a:rPr lang="en-US" dirty="0"/>
-              <a:t>7/8/2015</a:t>
+              <a:t>11/24/2024</a:t>
             </a:fld>
             <a:endParaRPr lang="en-US" dirty="0"/>
           </a:p>
@@ -875,7 +850,6 @@
           <a:bodyPr wrap="square"/>
           <a:lstStyle/>
           <a:p>
-            <a:pPr/>
             <a:endParaRPr lang="en-US" dirty="0"/>
           </a:p>
         </p:txBody>
@@ -900,7 +874,6 @@
           <a:bodyPr wrap="square"/>
           <a:lstStyle/>
           <a:p>
-            <a:pPr/>
             <a:fld id="{E1CC4C9C-B29E-4E68-9F89-CA7A1621DE94}" type="slidenum">
               <a:rPr lang="en-US" dirty="0"/>
               <a:t>‹#›</a:t>
@@ -955,19 +928,17 @@
           </a:ln>
         </p:spPr>
         <p:txBody>
-          <a:bodyPr anchor="b" wrap="square"/>
+          <a:bodyPr wrap="square" anchor="b"/>
           <a:lstStyle>
             <a:lvl1pPr>
               <a:defRPr sz="6000" dirty="0"/>
             </a:lvl1pPr>
           </a:lstStyle>
           <a:p>
-            <a:pPr/>
             <a:r>
               <a:rPr lang="en-US" dirty="0"/>
               <a:t>Click to edit Master title style</a:t>
             </a:r>
-            <a:endParaRPr lang="en-US" dirty="0"/>
           </a:p>
         </p:txBody>
       </p:sp>
@@ -1086,7 +1057,6 @@
             </a:lvl9pPr>
           </a:lstStyle>
           <a:p>
-            <a:pPr/>
             <a:r>
               <a:rPr lang="en-US" dirty="0"/>
               <a:t>Click to edit Master text styles</a:t>
@@ -1114,10 +1084,9 @@
           <a:bodyPr wrap="square"/>
           <a:lstStyle/>
           <a:p>
-            <a:pPr/>
             <a:fld id="{D4630D1D-EC81-4D12-BBAE-7AD5C46FE905}" type="datetimeFigureOut">
               <a:rPr lang="en-US" dirty="0"/>
-              <a:t>7/8/2015</a:t>
+              <a:t>11/24/2024</a:t>
             </a:fld>
             <a:endParaRPr lang="en-US" dirty="0"/>
           </a:p>
@@ -1143,7 +1112,6 @@
           <a:bodyPr wrap="square"/>
           <a:lstStyle/>
           <a:p>
-            <a:pPr/>
             <a:endParaRPr lang="en-US" dirty="0"/>
           </a:p>
         </p:txBody>
@@ -1168,7 +1136,6 @@
           <a:bodyPr wrap="square"/>
           <a:lstStyle/>
           <a:p>
-            <a:pPr/>
             <a:fld id="{E1CC4C9C-B29E-4E68-9F89-CA7A1621DE94}" type="slidenum">
               <a:rPr lang="en-US" dirty="0"/>
               <a:t>‹#›</a:t>
@@ -1222,12 +1189,10 @@
           <a:bodyPr wrap="square"/>
           <a:lstStyle/>
           <a:p>
-            <a:pPr/>
             <a:r>
               <a:rPr lang="en-US" dirty="0"/>
               <a:t>Click to edit Master title style</a:t>
             </a:r>
-            <a:endParaRPr lang="en-US" dirty="0"/>
           </a:p>
         </p:txBody>
       </p:sp>
@@ -1255,7 +1220,6 @@
           <a:bodyPr wrap="square"/>
           <a:lstStyle/>
           <a:p>
-            <a:pPr/>
             <a:r>
               <a:rPr lang="en-US" dirty="0"/>
               <a:t>Click to edit Master text styles</a:t>
@@ -1288,7 +1252,6 @@
               <a:rPr lang="en-US" dirty="0"/>
               <a:t>Fifth level</a:t>
             </a:r>
-            <a:endParaRPr lang="en-US" dirty="0"/>
           </a:p>
         </p:txBody>
       </p:sp>
@@ -1316,7 +1279,6 @@
           <a:bodyPr wrap="square"/>
           <a:lstStyle/>
           <a:p>
-            <a:pPr/>
             <a:r>
               <a:rPr lang="en-US" dirty="0"/>
               <a:t>Click to edit Master text styles</a:t>
@@ -1349,7 +1311,6 @@
               <a:rPr lang="en-US" dirty="0"/>
               <a:t>Fifth level</a:t>
             </a:r>
-            <a:endParaRPr lang="en-US" dirty="0"/>
           </a:p>
         </p:txBody>
       </p:sp>
@@ -1373,10 +1334,9 @@
           <a:bodyPr wrap="square"/>
           <a:lstStyle/>
           <a:p>
-            <a:pPr/>
             <a:fld id="{D4630D1D-EC81-4D12-BBAE-7AD5C46FE905}" type="datetimeFigureOut">
               <a:rPr lang="en-US" dirty="0"/>
-              <a:t>7/8/2015</a:t>
+              <a:t>11/24/2024</a:t>
             </a:fld>
             <a:endParaRPr lang="en-US" dirty="0"/>
           </a:p>
@@ -1402,7 +1362,6 @@
           <a:bodyPr wrap="square"/>
           <a:lstStyle/>
           <a:p>
-            <a:pPr/>
             <a:endParaRPr lang="en-US" dirty="0"/>
           </a:p>
         </p:txBody>
@@ -1427,7 +1386,6 @@
           <a:bodyPr wrap="square"/>
           <a:lstStyle/>
           <a:p>
-            <a:pPr/>
             <a:fld id="{E1CC4C9C-B29E-4E68-9F89-CA7A1621DE94}" type="slidenum">
               <a:rPr lang="en-US" dirty="0"/>
               <a:t>‹#›</a:t>
@@ -1485,12 +1443,10 @@
           <a:bodyPr wrap="square"/>
           <a:lstStyle/>
           <a:p>
-            <a:pPr/>
             <a:r>
               <a:rPr lang="en-US" dirty="0"/>
               <a:t>Click to edit Master title style</a:t>
             </a:r>
-            <a:endParaRPr lang="en-US" dirty="0"/>
           </a:p>
         </p:txBody>
       </p:sp>
@@ -1515,7 +1471,7 @@
           </a:ln>
         </p:spPr>
         <p:txBody>
-          <a:bodyPr anchor="b" wrap="square"/>
+          <a:bodyPr wrap="square" anchor="b"/>
           <a:lstStyle>
             <a:lvl1pPr marL="0" indent="0">
               <a:buNone/>
@@ -1555,7 +1511,6 @@
             </a:lvl9pPr>
           </a:lstStyle>
           <a:p>
-            <a:pPr/>
             <a:r>
               <a:rPr lang="en-US" dirty="0"/>
               <a:t>Click to edit Master text styles</a:t>
@@ -1587,7 +1542,6 @@
           <a:bodyPr wrap="square"/>
           <a:lstStyle/>
           <a:p>
-            <a:pPr/>
             <a:r>
               <a:rPr lang="en-US" dirty="0"/>
               <a:t>Click to edit Master text styles</a:t>
@@ -1620,7 +1574,6 @@
               <a:rPr lang="en-US" dirty="0"/>
               <a:t>Fifth level</a:t>
             </a:r>
-            <a:endParaRPr lang="en-US" dirty="0"/>
           </a:p>
         </p:txBody>
       </p:sp>
@@ -1645,7 +1598,7 @@
           </a:ln>
         </p:spPr>
         <p:txBody>
-          <a:bodyPr anchor="b" wrap="square"/>
+          <a:bodyPr wrap="square" anchor="b"/>
           <a:lstStyle>
             <a:lvl1pPr marL="0" indent="0">
               <a:buNone/>
@@ -1685,7 +1638,6 @@
             </a:lvl9pPr>
           </a:lstStyle>
           <a:p>
-            <a:pPr/>
             <a:r>
               <a:rPr lang="en-US" dirty="0"/>
               <a:t>Click to edit Master text styles</a:t>
@@ -1717,7 +1669,6 @@
           <a:bodyPr wrap="square"/>
           <a:lstStyle/>
           <a:p>
-            <a:pPr/>
             <a:r>
               <a:rPr lang="en-US" dirty="0"/>
               <a:t>Click to edit Master text styles</a:t>
@@ -1750,7 +1701,6 @@
               <a:rPr lang="en-US" dirty="0"/>
               <a:t>Fifth level</a:t>
             </a:r>
-            <a:endParaRPr lang="en-US" dirty="0"/>
           </a:p>
         </p:txBody>
       </p:sp>
@@ -1774,10 +1724,9 @@
           <a:bodyPr wrap="square"/>
           <a:lstStyle/>
           <a:p>
-            <a:pPr/>
             <a:fld id="{D4630D1D-EC81-4D12-BBAE-7AD5C46FE905}" type="datetimeFigureOut">
               <a:rPr lang="en-US" dirty="0"/>
-              <a:t>7/8/2015</a:t>
+              <a:t>11/24/2024</a:t>
             </a:fld>
             <a:endParaRPr lang="en-US" dirty="0"/>
           </a:p>
@@ -1803,7 +1752,6 @@
           <a:bodyPr wrap="square"/>
           <a:lstStyle/>
           <a:p>
-            <a:pPr/>
             <a:endParaRPr lang="en-US" dirty="0"/>
           </a:p>
         </p:txBody>
@@ -1828,7 +1776,6 @@
           <a:bodyPr wrap="square"/>
           <a:lstStyle/>
           <a:p>
-            <a:pPr/>
             <a:fld id="{E1CC4C9C-B29E-4E68-9F89-CA7A1621DE94}" type="slidenum">
               <a:rPr lang="en-US" dirty="0"/>
               <a:t>‹#›</a:t>
@@ -1882,12 +1829,10 @@
           <a:bodyPr wrap="square"/>
           <a:lstStyle/>
           <a:p>
-            <a:pPr/>
             <a:r>
               <a:rPr lang="en-US" dirty="0"/>
               <a:t>Click to edit Master title style</a:t>
             </a:r>
-            <a:endParaRPr lang="en-US" dirty="0"/>
           </a:p>
         </p:txBody>
       </p:sp>
@@ -1911,10 +1856,9 @@
           <a:bodyPr wrap="square"/>
           <a:lstStyle/>
           <a:p>
-            <a:pPr/>
             <a:fld id="{D4630D1D-EC81-4D12-BBAE-7AD5C46FE905}" type="datetimeFigureOut">
               <a:rPr lang="en-US" dirty="0"/>
-              <a:t>7/8/2015</a:t>
+              <a:t>11/24/2024</a:t>
             </a:fld>
             <a:endParaRPr lang="en-US" dirty="0"/>
           </a:p>
@@ -1940,7 +1884,6 @@
           <a:bodyPr wrap="square"/>
           <a:lstStyle/>
           <a:p>
-            <a:pPr/>
             <a:endParaRPr lang="en-US" dirty="0"/>
           </a:p>
         </p:txBody>
@@ -1965,7 +1908,6 @@
           <a:bodyPr wrap="square"/>
           <a:lstStyle/>
           <a:p>
-            <a:pPr/>
             <a:fld id="{E1CC4C9C-B29E-4E68-9F89-CA7A1621DE94}" type="slidenum">
               <a:rPr lang="en-US" dirty="0"/>
               <a:t>‹#›</a:t>
@@ -2019,10 +1961,9 @@
           <a:bodyPr wrap="square"/>
           <a:lstStyle/>
           <a:p>
-            <a:pPr/>
             <a:fld id="{D4630D1D-EC81-4D12-BBAE-7AD5C46FE905}" type="datetimeFigureOut">
               <a:rPr lang="en-US" dirty="0"/>
-              <a:t>7/8/2015</a:t>
+              <a:t>11/24/2024</a:t>
             </a:fld>
             <a:endParaRPr lang="en-US" dirty="0"/>
           </a:p>
@@ -2048,7 +1989,6 @@
           <a:bodyPr wrap="square"/>
           <a:lstStyle/>
           <a:p>
-            <a:pPr/>
             <a:endParaRPr lang="en-US" dirty="0"/>
           </a:p>
         </p:txBody>
@@ -2073,7 +2013,6 @@
           <a:bodyPr wrap="square"/>
           <a:lstStyle/>
           <a:p>
-            <a:pPr/>
             <a:fld id="{E1CC4C9C-B29E-4E68-9F89-CA7A1621DE94}" type="slidenum">
               <a:rPr lang="en-US" dirty="0"/>
               <a:t>‹#›</a:t>
@@ -2128,19 +2067,17 @@
           </a:ln>
         </p:spPr>
         <p:txBody>
-          <a:bodyPr anchor="b" wrap="square"/>
+          <a:bodyPr wrap="square" anchor="b"/>
           <a:lstStyle>
             <a:lvl1pPr>
               <a:defRPr sz="3200" dirty="0"/>
             </a:lvl1pPr>
           </a:lstStyle>
           <a:p>
-            <a:pPr/>
             <a:r>
               <a:rPr lang="en-US" dirty="0"/>
               <a:t>Click to edit Master title style</a:t>
             </a:r>
-            <a:endParaRPr lang="en-US" dirty="0"/>
           </a:p>
         </p:txBody>
       </p:sp>
@@ -2196,7 +2133,6 @@
             </a:lvl9pPr>
           </a:lstStyle>
           <a:p>
-            <a:pPr/>
             <a:r>
               <a:rPr lang="en-US" dirty="0"/>
               <a:t>Click to edit Master text styles</a:t>
@@ -2229,7 +2165,6 @@
               <a:rPr lang="en-US" dirty="0"/>
               <a:t>Fifth level</a:t>
             </a:r>
-            <a:endParaRPr lang="en-US" dirty="0"/>
           </a:p>
         </p:txBody>
       </p:sp>
@@ -2294,7 +2229,6 @@
             </a:lvl9pPr>
           </a:lstStyle>
           <a:p>
-            <a:pPr/>
             <a:r>
               <a:rPr lang="en-US" dirty="0"/>
               <a:t>Click to edit Master text styles</a:t>
@@ -2322,10 +2256,9 @@
           <a:bodyPr wrap="square"/>
           <a:lstStyle/>
           <a:p>
-            <a:pPr/>
             <a:fld id="{D4630D1D-EC81-4D12-BBAE-7AD5C46FE905}" type="datetimeFigureOut">
               <a:rPr lang="en-US" dirty="0"/>
-              <a:t>7/8/2015</a:t>
+              <a:t>11/24/2024</a:t>
             </a:fld>
             <a:endParaRPr lang="en-US" dirty="0"/>
           </a:p>
@@ -2351,7 +2284,6 @@
           <a:bodyPr wrap="square"/>
           <a:lstStyle/>
           <a:p>
-            <a:pPr/>
             <a:endParaRPr lang="en-US" dirty="0"/>
           </a:p>
         </p:txBody>
@@ -2376,7 +2308,6 @@
           <a:bodyPr wrap="square"/>
           <a:lstStyle/>
           <a:p>
-            <a:pPr/>
             <a:fld id="{E1CC4C9C-B29E-4E68-9F89-CA7A1621DE94}" type="slidenum">
               <a:rPr lang="en-US" dirty="0"/>
               <a:t>‹#›</a:t>
@@ -2431,19 +2362,17 @@
           </a:ln>
         </p:spPr>
         <p:txBody>
-          <a:bodyPr anchor="b" wrap="square"/>
+          <a:bodyPr wrap="square" anchor="b"/>
           <a:lstStyle>
             <a:lvl1pPr>
               <a:defRPr sz="3200" dirty="0"/>
             </a:lvl1pPr>
           </a:lstStyle>
           <a:p>
-            <a:pPr/>
             <a:r>
               <a:rPr lang="en-US" dirty="0"/>
               <a:t>Click to edit Master title style</a:t>
             </a:r>
-            <a:endParaRPr lang="en-US" dirty="0"/>
           </a:p>
         </p:txBody>
       </p:sp>
@@ -2508,7 +2437,6 @@
             </a:lvl9pPr>
           </a:lstStyle>
           <a:p>
-            <a:pPr/>
             <a:endParaRPr lang="en-US" dirty="0"/>
           </a:p>
         </p:txBody>
@@ -2574,7 +2502,6 @@
             </a:lvl9pPr>
           </a:lstStyle>
           <a:p>
-            <a:pPr/>
             <a:r>
               <a:rPr lang="en-US" dirty="0"/>
               <a:t>Click to edit Master text styles</a:t>
@@ -2602,10 +2529,9 @@
           <a:bodyPr wrap="square"/>
           <a:lstStyle/>
           <a:p>
-            <a:pPr/>
             <a:fld id="{D4630D1D-EC81-4D12-BBAE-7AD5C46FE905}" type="datetimeFigureOut">
               <a:rPr lang="en-US" dirty="0"/>
-              <a:t>7/8/2015</a:t>
+              <a:t>11/24/2024</a:t>
             </a:fld>
             <a:endParaRPr lang="en-US" dirty="0"/>
           </a:p>
@@ -2631,7 +2557,6 @@
           <a:bodyPr wrap="square"/>
           <a:lstStyle/>
           <a:p>
-            <a:pPr/>
             <a:endParaRPr lang="en-US" dirty="0"/>
           </a:p>
         </p:txBody>
@@ -2656,7 +2581,6 @@
           <a:bodyPr wrap="square"/>
           <a:lstStyle/>
           <a:p>
-            <a:pPr/>
             <a:fld id="{E1CC4C9C-B29E-4E68-9F89-CA7A1621DE94}" type="slidenum">
               <a:rPr lang="en-US" dirty="0"/>
               <a:t>‹#›</a:t>
@@ -2681,6 +2605,7 @@
         <a:solidFill>
           <a:schemeClr val="bg1"/>
         </a:solidFill>
+        <a:effectLst/>
       </p:bgPr>
     </p:bg>
     <p:spTree>
@@ -2721,17 +2646,15 @@
           </a:ln>
         </p:spPr>
         <p:txBody>
-          <a:bodyPr lIns="91440" tIns="45720" rIns="91440" bIns="45720" anchor="ctr" wrap="square">
+          <a:bodyPr wrap="square" lIns="91440" tIns="45720" rIns="91440" bIns="45720" anchor="ctr">
             <a:normAutofit/>
           </a:bodyPr>
           <a:lstStyle/>
           <a:p>
-            <a:pPr/>
             <a:r>
               <a:rPr lang="en-US" dirty="0"/>
               <a:t>Click to edit Master title style</a:t>
             </a:r>
-            <a:endParaRPr lang="en-US" dirty="0"/>
           </a:p>
         </p:txBody>
       </p:sp>
@@ -2759,12 +2682,11 @@
           </a:ln>
         </p:spPr>
         <p:txBody>
-          <a:bodyPr lIns="91440" tIns="45720" rIns="91440" bIns="45720" wrap="square">
+          <a:bodyPr wrap="square" lIns="91440" tIns="45720" rIns="91440" bIns="45720">
             <a:normAutofit/>
           </a:bodyPr>
           <a:lstStyle/>
           <a:p>
-            <a:pPr/>
             <a:r>
               <a:rPr lang="en-US" dirty="0"/>
               <a:t>Click to edit Master text styles</a:t>
@@ -2797,7 +2719,6 @@
               <a:rPr lang="en-US" dirty="0"/>
               <a:t>Fifth level</a:t>
             </a:r>
-            <a:endParaRPr lang="en-US" dirty="0"/>
           </a:p>
         </p:txBody>
       </p:sp>
@@ -2825,7 +2746,7 @@
           </a:ln>
         </p:spPr>
         <p:txBody>
-          <a:bodyPr lIns="91440" tIns="45720" rIns="91440" bIns="45720" anchor="ctr" wrap="square"/>
+          <a:bodyPr wrap="square" lIns="91440" tIns="45720" rIns="91440" bIns="45720" anchor="ctr"/>
           <a:lstStyle>
             <a:lvl1pPr algn="l">
               <a:defRPr sz="1200" dirty="0">
@@ -2838,10 +2759,9 @@
             </a:lvl1pPr>
           </a:lstStyle>
           <a:p>
-            <a:pPr/>
             <a:fld id="{D4630D1D-EC81-4D12-BBAE-7AD5C46FE905}" type="datetimeFigureOut">
               <a:rPr lang="en-US" dirty="0"/>
-              <a:t>7/8/2015</a:t>
+              <a:t>11/24/2024</a:t>
             </a:fld>
             <a:endParaRPr lang="en-US" dirty="0"/>
           </a:p>
@@ -2871,7 +2791,7 @@
           </a:ln>
         </p:spPr>
         <p:txBody>
-          <a:bodyPr lIns="91440" tIns="45720" rIns="91440" bIns="45720" anchor="ctr" wrap="square"/>
+          <a:bodyPr wrap="square" lIns="91440" tIns="45720" rIns="91440" bIns="45720" anchor="ctr"/>
           <a:lstStyle>
             <a:lvl1pPr algn="ctr">
               <a:defRPr sz="1200" dirty="0">
@@ -2884,7 +2804,6 @@
             </a:lvl1pPr>
           </a:lstStyle>
           <a:p>
-            <a:pPr/>
             <a:endParaRPr lang="en-US" dirty="0"/>
           </a:p>
         </p:txBody>
@@ -2913,7 +2832,7 @@
           </a:ln>
         </p:spPr>
         <p:txBody>
-          <a:bodyPr lIns="91440" tIns="45720" rIns="91440" bIns="45720" anchor="ctr" wrap="square"/>
+          <a:bodyPr wrap="square" lIns="91440" tIns="45720" rIns="91440" bIns="45720" anchor="ctr"/>
           <a:lstStyle>
             <a:lvl1pPr algn="r">
               <a:defRPr sz="1200" dirty="0">
@@ -2926,7 +2845,6 @@
             </a:lvl1pPr>
           </a:lstStyle>
           <a:p>
-            <a:pPr/>
             <a:fld id="{E1CC4C9C-B29E-4E68-9F89-CA7A1621DE94}" type="slidenum">
               <a:rPr lang="en-US" dirty="0"/>
               <a:t>‹#›</a:t>
@@ -2953,7 +2871,7 @@
   </p:sldLayoutIdLst>
   <p:txStyles>
     <p:titleStyle>
-      <a:lvl1pPr rtl="0" algn="l" defTabSz="914400">
+      <a:lvl1pPr algn="l" defTabSz="914400" rtl="0">
         <a:lnSpc>
           <a:spcPct val="90000"/>
         </a:lnSpc>
@@ -2972,7 +2890,7 @@
       </a:lvl1pPr>
     </p:titleStyle>
     <p:bodyStyle>
-      <a:lvl1pPr marL="228600" indent="-228600" rtl="0" algn="l" defTabSz="914400">
+      <a:lvl1pPr marL="228600" indent="-228600" algn="l" defTabSz="914400" rtl="0">
         <a:lnSpc>
           <a:spcPct val="90000"/>
         </a:lnSpc>
@@ -2990,7 +2908,7 @@
           <a:cs typeface="+mn-cs"/>
         </a:defRPr>
       </a:lvl1pPr>
-      <a:lvl2pPr marL="685800" indent="-228600" rtl="0" algn="l" defTabSz="914400">
+      <a:lvl2pPr marL="685800" indent="-228600" algn="l" defTabSz="914400" rtl="0">
         <a:lnSpc>
           <a:spcPct val="90000"/>
         </a:lnSpc>
@@ -3008,7 +2926,7 @@
           <a:cs typeface="+mn-cs"/>
         </a:defRPr>
       </a:lvl2pPr>
-      <a:lvl3pPr marL="1143000" indent="-228600" rtl="0" algn="l" defTabSz="914400">
+      <a:lvl3pPr marL="1143000" indent="-228600" algn="l" defTabSz="914400" rtl="0">
         <a:lnSpc>
           <a:spcPct val="90000"/>
         </a:lnSpc>
@@ -3026,7 +2944,7 @@
           <a:cs typeface="+mn-cs"/>
         </a:defRPr>
       </a:lvl3pPr>
-      <a:lvl4pPr marL="1600200" indent="-228600" rtl="0" algn="l" defTabSz="914400">
+      <a:lvl4pPr marL="1600200" indent="-228600" algn="l" defTabSz="914400" rtl="0">
         <a:lnSpc>
           <a:spcPct val="90000"/>
         </a:lnSpc>
@@ -3044,7 +2962,7 @@
           <a:cs typeface="+mn-cs"/>
         </a:defRPr>
       </a:lvl4pPr>
-      <a:lvl5pPr marL="2057400" indent="-228600" rtl="0" algn="l" defTabSz="914400">
+      <a:lvl5pPr marL="2057400" indent="-228600" algn="l" defTabSz="914400" rtl="0">
         <a:lnSpc>
           <a:spcPct val="90000"/>
         </a:lnSpc>
@@ -3062,7 +2980,7 @@
           <a:cs typeface="+mn-cs"/>
         </a:defRPr>
       </a:lvl5pPr>
-      <a:lvl6pPr marL="2514600" indent="-228600" rtl="0" algn="l" defTabSz="914400">
+      <a:lvl6pPr marL="2514600" indent="-228600" algn="l" defTabSz="914400" rtl="0">
         <a:lnSpc>
           <a:spcPct val="90000"/>
         </a:lnSpc>
@@ -3080,7 +2998,7 @@
           <a:cs typeface="+mn-cs"/>
         </a:defRPr>
       </a:lvl6pPr>
-      <a:lvl7pPr marL="2971800" indent="-228600" rtl="0" algn="l" defTabSz="914400">
+      <a:lvl7pPr marL="2971800" indent="-228600" algn="l" defTabSz="914400" rtl="0">
         <a:lnSpc>
           <a:spcPct val="90000"/>
         </a:lnSpc>
@@ -3098,7 +3016,7 @@
           <a:cs typeface="+mn-cs"/>
         </a:defRPr>
       </a:lvl7pPr>
-      <a:lvl8pPr marL="3429000" indent="-228600" rtl="0" algn="l" defTabSz="914400">
+      <a:lvl8pPr marL="3429000" indent="-228600" algn="l" defTabSz="914400" rtl="0">
         <a:lnSpc>
           <a:spcPct val="90000"/>
         </a:lnSpc>
@@ -3116,7 +3034,7 @@
           <a:cs typeface="+mn-cs"/>
         </a:defRPr>
       </a:lvl8pPr>
-      <a:lvl9pPr marL="3886200" indent="-228600" rtl="0" algn="l" defTabSz="914400">
+      <a:lvl9pPr marL="3886200" indent="-228600" algn="l" defTabSz="914400" rtl="0">
         <a:lnSpc>
           <a:spcPct val="90000"/>
         </a:lnSpc>
@@ -3139,7 +3057,7 @@
       <a:defPPr defTabSz="914400">
         <a:defRPr lang="en-US" dirty="0"/>
       </a:defPPr>
-      <a:lvl1pPr marL="0" rtl="0" algn="l" defTabSz="914400">
+      <a:lvl1pPr marL="0" algn="l" defTabSz="914400" rtl="0">
         <a:defRPr sz="1800" kern="1200" dirty="0">
           <a:solidFill>
             <a:schemeClr val="tx1"/>
@@ -3149,7 +3067,7 @@
           <a:cs typeface="+mn-cs"/>
         </a:defRPr>
       </a:lvl1pPr>
-      <a:lvl2pPr marL="457200" rtl="0" algn="l" defTabSz="914400">
+      <a:lvl2pPr marL="457200" algn="l" defTabSz="914400" rtl="0">
         <a:defRPr sz="1800" kern="1200" dirty="0">
           <a:solidFill>
             <a:schemeClr val="tx1"/>
@@ -3159,7 +3077,7 @@
           <a:cs typeface="+mn-cs"/>
         </a:defRPr>
       </a:lvl2pPr>
-      <a:lvl3pPr marL="914400" rtl="0" algn="l" defTabSz="914400">
+      <a:lvl3pPr marL="914400" algn="l" defTabSz="914400" rtl="0">
         <a:defRPr sz="1800" kern="1200" dirty="0">
           <a:solidFill>
             <a:schemeClr val="tx1"/>
@@ -3169,7 +3087,7 @@
           <a:cs typeface="+mn-cs"/>
         </a:defRPr>
       </a:lvl3pPr>
-      <a:lvl4pPr marL="1371600" rtl="0" algn="l" defTabSz="914400">
+      <a:lvl4pPr marL="1371600" algn="l" defTabSz="914400" rtl="0">
         <a:defRPr sz="1800" kern="1200" dirty="0">
           <a:solidFill>
             <a:schemeClr val="tx1"/>
@@ -3179,7 +3097,7 @@
           <a:cs typeface="+mn-cs"/>
         </a:defRPr>
       </a:lvl4pPr>
-      <a:lvl5pPr marL="1828800" rtl="0" algn="l" defTabSz="914400">
+      <a:lvl5pPr marL="1828800" algn="l" defTabSz="914400" rtl="0">
         <a:defRPr sz="1800" kern="1200" dirty="0">
           <a:solidFill>
             <a:schemeClr val="tx1"/>
@@ -3189,7 +3107,7 @@
           <a:cs typeface="+mn-cs"/>
         </a:defRPr>
       </a:lvl5pPr>
-      <a:lvl6pPr marL="2286000" rtl="0" algn="l" defTabSz="914400">
+      <a:lvl6pPr marL="2286000" algn="l" defTabSz="914400" rtl="0">
         <a:defRPr sz="1800" kern="1200" dirty="0">
           <a:solidFill>
             <a:schemeClr val="tx1"/>
@@ -3199,7 +3117,7 @@
           <a:cs typeface="+mn-cs"/>
         </a:defRPr>
       </a:lvl6pPr>
-      <a:lvl7pPr marL="2743200" rtl="0" algn="l" defTabSz="914400">
+      <a:lvl7pPr marL="2743200" algn="l" defTabSz="914400" rtl="0">
         <a:defRPr sz="1800" kern="1200" dirty="0">
           <a:solidFill>
             <a:schemeClr val="tx1"/>
@@ -3209,7 +3127,7 @@
           <a:cs typeface="+mn-cs"/>
         </a:defRPr>
       </a:lvl7pPr>
-      <a:lvl8pPr marL="3200400" rtl="0" algn="l" defTabSz="914400">
+      <a:lvl8pPr marL="3200400" algn="l" defTabSz="914400" rtl="0">
         <a:defRPr sz="1800" kern="1200" dirty="0">
           <a:solidFill>
             <a:schemeClr val="tx1"/>
@@ -3219,7 +3137,7 @@
           <a:cs typeface="+mn-cs"/>
         </a:defRPr>
       </a:lvl8pPr>
-      <a:lvl9pPr marL="3657600" rtl="0" algn="l" defTabSz="914400">
+      <a:lvl9pPr marL="3657600" algn="l" defTabSz="914400" rtl="0">
         <a:defRPr sz="1800" kern="1200" dirty="0">
           <a:solidFill>
             <a:schemeClr val="tx1"/>
@@ -3260,7 +3178,7 @@
           <p:nvPr/>
         </p:nvSpPr>
         <p:spPr>
-          <a:xfrm rot="0">
+          <a:xfrm>
             <a:off x="635000" y="635000"/>
             <a:ext cx="7620000" cy="635000"/>
           </a:xfrm>
@@ -3301,9 +3219,9 @@
           <p:nvPr/>
         </p:nvSpPr>
         <p:spPr>
-          <a:xfrm rot="0">
+          <a:xfrm>
             <a:off x="635000" y="1270000"/>
-            <a:ext cx="7620000" cy="635000"/>
+            <a:ext cx="7620000" cy="369332"/>
           </a:xfrm>
           <a:prstGeom prst="rect">
             <a:avLst/>
@@ -3328,8 +3246,25 @@
                   </a:srgbClr>
                 </a:solidFill>
               </a:rPr>
-              <a:t>Id: 412</a:t>
-            </a:r>
+              <a:t>Id: </a:t>
+            </a:r>
+            <a:r>
+              <a:rPr lang="en-US" sz="1800" b="0" i="0" dirty="0">
+                <a:solidFill>
+                  <a:srgbClr val="D07886">
+                    <a:alpha val="100000"/>
+                  </a:srgbClr>
+                </a:solidFill>
+              </a:rPr>
+              <a:t>4</a:t>
+            </a:r>
+            <a:endParaRPr sz="1800" b="0" i="0" dirty="0">
+              <a:solidFill>
+                <a:srgbClr val="D07886">
+                  <a:alpha val="100000"/>
+                </a:srgbClr>
+              </a:solidFill>
+            </a:endParaRPr>
           </a:p>
         </p:txBody>
       </p:sp>
@@ -3342,7 +3277,7 @@
           <p:nvPr/>
         </p:nvSpPr>
         <p:spPr>
-          <a:xfrm rot="0">
+          <a:xfrm>
             <a:off x="635000" y="1905000"/>
             <a:ext cx="7620000" cy="635000"/>
           </a:xfrm>
@@ -3383,7 +3318,7 @@
           <p:nvPr/>
         </p:nvSpPr>
         <p:spPr>
-          <a:xfrm rot="0">
+          <a:xfrm>
             <a:off x="635000" y="2540000"/>
             <a:ext cx="7620000" cy="635000"/>
           </a:xfrm>
@@ -3424,7 +3359,7 @@
           <p:nvPr/>
         </p:nvSpPr>
         <p:spPr>
-          <a:xfrm rot="0">
+          <a:xfrm>
             <a:off x="635000" y="3175000"/>
             <a:ext cx="7620000" cy="635000"/>
           </a:xfrm>
@@ -3491,7 +3426,7 @@
           <p:nvPr/>
         </p:nvSpPr>
         <p:spPr>
-          <a:xfrm rot="0">
+          <a:xfrm>
             <a:off x="635000" y="635000"/>
             <a:ext cx="7620000" cy="635000"/>
           </a:xfrm>
@@ -3532,9 +3467,9 @@
           <p:nvPr/>
         </p:nvSpPr>
         <p:spPr>
-          <a:xfrm rot="0">
+          <a:xfrm>
             <a:off x="635000" y="1270000"/>
-            <a:ext cx="7620000" cy="635000"/>
+            <a:ext cx="7620000" cy="369332"/>
           </a:xfrm>
           <a:prstGeom prst="rect">
             <a:avLst/>
@@ -3559,8 +3494,25 @@
                   </a:srgbClr>
                 </a:solidFill>
               </a:rPr>
-              <a:t>Book Id: 412</a:t>
-            </a:r>
+              <a:t>Book Id: </a:t>
+            </a:r>
+            <a:r>
+              <a:rPr lang="en-US" sz="1800" b="0" i="0" dirty="0">
+                <a:solidFill>
+                  <a:srgbClr val="D07886">
+                    <a:alpha val="100000"/>
+                  </a:srgbClr>
+                </a:solidFill>
+              </a:rPr>
+              <a:t>4</a:t>
+            </a:r>
+            <a:endParaRPr sz="1800" b="0" i="0" dirty="0">
+              <a:solidFill>
+                <a:srgbClr val="D07886">
+                  <a:alpha val="100000"/>
+                </a:srgbClr>
+              </a:solidFill>
+            </a:endParaRPr>
           </a:p>
         </p:txBody>
       </p:sp>
@@ -3573,7 +3525,7 @@
           <p:nvPr/>
         </p:nvSpPr>
         <p:spPr>
-          <a:xfrm rot="0">
+          <a:xfrm>
             <a:off x="635000" y="1905000"/>
             <a:ext cx="7620000" cy="635000"/>
           </a:xfrm>
@@ -3614,7 +3566,7 @@
           <p:nvPr/>
         </p:nvSpPr>
         <p:spPr>
-          <a:xfrm rot="0">
+          <a:xfrm>
             <a:off x="635000" y="2540000"/>
             <a:ext cx="7620000" cy="635000"/>
           </a:xfrm>
@@ -3662,7 +3614,7 @@
         <a:srgbClr val="000000"/>
       </a:dk1>
       <a:lt1>
-        <a:srgbClr val="ffffff"/>
+        <a:srgbClr val="FFFFFF"/>
       </a:lt1>
       <a:dk2>
         <a:srgbClr val="44546A"/>
@@ -3911,5 +3863,7 @@
       </a:bgFillStyleLst>
     </a:fmtScheme>
   </a:themeElements>
+  <a:objectDefaults/>
+  <a:extraClrSchemeLst/>
 </a:theme>
 </file>
</xml_diff>

<commit_message>
basic functionallity mobile client
</commit_message>
<xml_diff>
--- a/Storage/App_Data/Books/Solace.pptx
+++ b/Storage/App_Data/Books/Solace.pptx
@@ -255,7 +255,7 @@
           <a:p>
             <a:fld id="{D4630D1D-EC81-4D12-BBAE-7AD5C46FE905}" type="datetimeFigureOut">
               <a:rPr lang="en-US" dirty="0"/>
-              <a:t>11/24/2024</a:t>
+              <a:t>11/28/2024</a:t>
             </a:fld>
             <a:endParaRPr lang="en-US" dirty="0"/>
           </a:p>
@@ -442,7 +442,7 @@
           <a:p>
             <a:fld id="{D4630D1D-EC81-4D12-BBAE-7AD5C46FE905}" type="datetimeFigureOut">
               <a:rPr lang="en-US" dirty="0"/>
-              <a:t>11/24/2024</a:t>
+              <a:t>11/28/2024</a:t>
             </a:fld>
             <a:endParaRPr lang="en-US" dirty="0"/>
           </a:p>
@@ -637,7 +637,7 @@
           <a:p>
             <a:fld id="{D4630D1D-EC81-4D12-BBAE-7AD5C46FE905}" type="datetimeFigureOut">
               <a:rPr lang="en-US" dirty="0"/>
-              <a:t>11/24/2024</a:t>
+              <a:t>11/28/2024</a:t>
             </a:fld>
             <a:endParaRPr lang="en-US" dirty="0"/>
           </a:p>
@@ -824,7 +824,7 @@
           <a:p>
             <a:fld id="{D4630D1D-EC81-4D12-BBAE-7AD5C46FE905}" type="datetimeFigureOut">
               <a:rPr lang="en-US" dirty="0"/>
-              <a:t>11/24/2024</a:t>
+              <a:t>11/28/2024</a:t>
             </a:fld>
             <a:endParaRPr lang="en-US" dirty="0"/>
           </a:p>
@@ -1086,7 +1086,7 @@
           <a:p>
             <a:fld id="{D4630D1D-EC81-4D12-BBAE-7AD5C46FE905}" type="datetimeFigureOut">
               <a:rPr lang="en-US" dirty="0"/>
-              <a:t>11/24/2024</a:t>
+              <a:t>11/28/2024</a:t>
             </a:fld>
             <a:endParaRPr lang="en-US" dirty="0"/>
           </a:p>
@@ -1336,7 +1336,7 @@
           <a:p>
             <a:fld id="{D4630D1D-EC81-4D12-BBAE-7AD5C46FE905}" type="datetimeFigureOut">
               <a:rPr lang="en-US" dirty="0"/>
-              <a:t>11/24/2024</a:t>
+              <a:t>11/28/2024</a:t>
             </a:fld>
             <a:endParaRPr lang="en-US" dirty="0"/>
           </a:p>
@@ -1726,7 +1726,7 @@
           <a:p>
             <a:fld id="{D4630D1D-EC81-4D12-BBAE-7AD5C46FE905}" type="datetimeFigureOut">
               <a:rPr lang="en-US" dirty="0"/>
-              <a:t>11/24/2024</a:t>
+              <a:t>11/28/2024</a:t>
             </a:fld>
             <a:endParaRPr lang="en-US" dirty="0"/>
           </a:p>
@@ -1858,7 +1858,7 @@
           <a:p>
             <a:fld id="{D4630D1D-EC81-4D12-BBAE-7AD5C46FE905}" type="datetimeFigureOut">
               <a:rPr lang="en-US" dirty="0"/>
-              <a:t>11/24/2024</a:t>
+              <a:t>11/28/2024</a:t>
             </a:fld>
             <a:endParaRPr lang="en-US" dirty="0"/>
           </a:p>
@@ -1963,7 +1963,7 @@
           <a:p>
             <a:fld id="{D4630D1D-EC81-4D12-BBAE-7AD5C46FE905}" type="datetimeFigureOut">
               <a:rPr lang="en-US" dirty="0"/>
-              <a:t>11/24/2024</a:t>
+              <a:t>11/28/2024</a:t>
             </a:fld>
             <a:endParaRPr lang="en-US" dirty="0"/>
           </a:p>
@@ -2258,7 +2258,7 @@
           <a:p>
             <a:fld id="{D4630D1D-EC81-4D12-BBAE-7AD5C46FE905}" type="datetimeFigureOut">
               <a:rPr lang="en-US" dirty="0"/>
-              <a:t>11/24/2024</a:t>
+              <a:t>11/28/2024</a:t>
             </a:fld>
             <a:endParaRPr lang="en-US" dirty="0"/>
           </a:p>
@@ -2531,7 +2531,7 @@
           <a:p>
             <a:fld id="{D4630D1D-EC81-4D12-BBAE-7AD5C46FE905}" type="datetimeFigureOut">
               <a:rPr lang="en-US" dirty="0"/>
-              <a:t>11/24/2024</a:t>
+              <a:t>11/28/2024</a:t>
             </a:fld>
             <a:endParaRPr lang="en-US" dirty="0"/>
           </a:p>
@@ -2761,7 +2761,7 @@
           <a:p>
             <a:fld id="{D4630D1D-EC81-4D12-BBAE-7AD5C46FE905}" type="datetimeFigureOut">
               <a:rPr lang="en-US" dirty="0"/>
-              <a:t>11/24/2024</a:t>
+              <a:t>11/28/2024</a:t>
             </a:fld>
             <a:endParaRPr lang="en-US" dirty="0"/>
           </a:p>
@@ -3221,7 +3221,7 @@
         <p:spPr>
           <a:xfrm>
             <a:off x="635000" y="1270000"/>
-            <a:ext cx="7620000" cy="369332"/>
+            <a:ext cx="7620000" cy="635000"/>
           </a:xfrm>
           <a:prstGeom prst="rect">
             <a:avLst/>
@@ -3241,30 +3241,13 @@
             <a:r>
               <a:rPr sz="1800" b="0" i="0" dirty="0">
                 <a:solidFill>
-                  <a:srgbClr val="D07886">
+                  <a:srgbClr val="FB312D">
                     <a:alpha val="100000"/>
                   </a:srgbClr>
                 </a:solidFill>
               </a:rPr>
-              <a:t>Id: </a:t>
-            </a:r>
-            <a:r>
-              <a:rPr lang="en-US" sz="1800" b="0" i="0" dirty="0">
-                <a:solidFill>
-                  <a:srgbClr val="D07886">
-                    <a:alpha val="100000"/>
-                  </a:srgbClr>
-                </a:solidFill>
-              </a:rPr>
-              <a:t>4</a:t>
-            </a:r>
-            <a:endParaRPr sz="1800" b="0" i="0" dirty="0">
-              <a:solidFill>
-                <a:srgbClr val="D07886">
-                  <a:alpha val="100000"/>
-                </a:srgbClr>
-              </a:solidFill>
-            </a:endParaRPr>
+              <a:t>Id: 4</a:t>
+            </a:r>
           </a:p>
         </p:txBody>
       </p:sp>
@@ -3469,7 +3452,7 @@
         <p:spPr>
           <a:xfrm>
             <a:off x="635000" y="1270000"/>
-            <a:ext cx="7620000" cy="369332"/>
+            <a:ext cx="7620000" cy="635000"/>
           </a:xfrm>
           <a:prstGeom prst="rect">
             <a:avLst/>
@@ -3489,30 +3472,13 @@
             <a:r>
               <a:rPr sz="1800" b="0" i="0" dirty="0">
                 <a:solidFill>
-                  <a:srgbClr val="D07886">
+                  <a:srgbClr val="FB312D">
                     <a:alpha val="100000"/>
                   </a:srgbClr>
                 </a:solidFill>
               </a:rPr>
-              <a:t>Book Id: </a:t>
-            </a:r>
-            <a:r>
-              <a:rPr lang="en-US" sz="1800" b="0" i="0" dirty="0">
-                <a:solidFill>
-                  <a:srgbClr val="D07886">
-                    <a:alpha val="100000"/>
-                  </a:srgbClr>
-                </a:solidFill>
-              </a:rPr>
-              <a:t>4</a:t>
-            </a:r>
-            <a:endParaRPr sz="1800" b="0" i="0" dirty="0">
-              <a:solidFill>
-                <a:srgbClr val="D07886">
-                  <a:alpha val="100000"/>
-                </a:srgbClr>
-              </a:solidFill>
-            </a:endParaRPr>
+              <a:t>Book Id: 4</a:t>
+            </a:r>
           </a:p>
         </p:txBody>
       </p:sp>

</xml_diff>

<commit_message>
book management in desktop client
</commit_message>
<xml_diff>
--- a/Storage/App_Data/Books/Solace.pptx
+++ b/Storage/App_Data/Books/Solace.pptx
@@ -7,6 +7,7 @@
   <p:sldIdLst>
     <p:sldId id="256" r:id="rId6"/>
     <p:sldId id="257" r:id="rId7"/>
+    <p:sldId id="258" r:id="rId8"/>
   </p:sldIdLst>
   <p:sldSz cx="12192000" cy="6858000" type="custom"/>
   <p:notesSz cx="6858000" cy="9144000"/>
@@ -2932,6 +2933,47 @@
               <a:t>‹#›</a:t>
             </a:fld>
             <a:endParaRPr lang="en-US" dirty="0"/>
+          </a:p>
+        </p:txBody>
+      </p:sp>
+      <p:sp>
+        <p:nvSpPr>
+          <p:cNvPr id="7" name="SyncfusionLicense"/>
+          <p:cNvSpPr txBox="1">
+            <a:spLocks noChangeArrowheads="1"/>
+          </p:cNvSpPr>
+          <p:nvPr/>
+        </p:nvSpPr>
+        <p:spPr>
+          <a:xfrm rot="19980000">
+            <a:off x="3206750" y="3111500"/>
+            <a:ext cx="5778500" cy="635000"/>
+          </a:xfrm>
+          <a:prstGeom prst="rect">
+            <a:avLst/>
+          </a:prstGeom>
+          <a:ln>
+            <a:headEnd type="none"/>
+            <a:tailEnd type="none"/>
+          </a:ln>
+        </p:spPr>
+        <p:txBody>
+          <a:bodyPr anchor="ctr" wrap="square">
+            <a:spAutoFit/>
+          </a:bodyPr>
+          <a:lstStyle/>
+          <a:p>
+            <a:pPr algn="ctr" defTabSz="914400">
+              <a:defRPr sz="1800" dirty="0">
+                <a:solidFill>
+                  <a:srgbClr val="FF0000"/>
+                </a:solidFill>
+              </a:defRPr>
+            </a:pPr>
+            <a:r>
+              <a:rPr/>
+              <a:t>Created with a trial version of Syncfusion PowerPoint library</a:t>
+            </a:r>
           </a:p>
         </p:txBody>
       </p:sp>
@@ -3457,6 +3499,69 @@
           </a:p>
         </p:txBody>
       </p:sp>
+      <p:sp>
+        <p:nvSpPr>
+          <p:cNvPr id="7" name="SyncfusionLicense"/>
+          <p:cNvSpPr txBox="1">
+            <a:spLocks noChangeArrowheads="1"/>
+          </p:cNvSpPr>
+          <p:nvPr/>
+        </p:nvSpPr>
+        <p:spPr>
+          <a:xfrm rot="0">
+            <a:off x="0" y="5715000"/>
+            <a:ext cx="12192000" cy="1143000"/>
+          </a:xfrm>
+          <a:prstGeom prst="rect">
+            <a:avLst/>
+          </a:prstGeom>
+          <a:solidFill>
+            <a:srgbClr val="FFFFFF"/>
+          </a:solidFill>
+          <a:ln>
+            <a:headEnd type="none"/>
+            <a:tailEnd type="none"/>
+          </a:ln>
+        </p:spPr>
+        <p:txBody>
+          <a:bodyPr anchor="ctr" wrap="square">
+            <a:spAutoFit/>
+          </a:bodyPr>
+          <a:lstStyle/>
+          <a:p>
+            <a:pPr algn="ctr" defTabSz="914400">
+              <a:defRPr sz="1800" dirty="0">
+                <a:solidFill>
+                  <a:srgbClr val="FF0000"/>
+                </a:solidFill>
+              </a:defRPr>
+            </a:pPr>
+            <a:r>
+              <a:rPr/>
+              <a:t>Created with a trial version of Syncfusion PowerPoint library or registered the wrong key in your application. Click </a:t>
+            </a:r>
+            <a:r>
+              <a:rPr dirty="0">
+                <a:solidFill>
+                  <a:srgbClr val="0000FF"/>
+                </a:solidFill>
+                <a:hlinkClick r:id="rId3" action="ppaction://hlinkfile">
+                  <a:extLst>
+                    <a:ext uri="{A12FA001-AC4F-418D-AE19-62706E023703}">
+                      <ahyp:hlinkClr xmlns:ahyp="http://schemas.microsoft.com/office/drawing/2018/hyperlinkcolor" val="tx"/>
+                    </a:ext>
+                  </a:extLst>
+                </a:hlinkClick>
+              </a:rPr>
+              <a:t>here</a:t>
+            </a:r>
+            <a:r>
+              <a:rPr/>
+              <a:t> to obtain the valid key.</a:t>
+            </a:r>
+          </a:p>
+        </p:txBody>
+      </p:sp>
     </p:spTree>
   </p:cSld>
   <p:clrMapOvr>
@@ -3642,6 +3747,300 @@
                 </a:solidFill>
               </a:rPr>
               <a:t>Content: THIS IS HARRY POTTER 1</a:t>
+            </a:r>
+          </a:p>
+        </p:txBody>
+      </p:sp>
+    </p:spTree>
+  </p:cSld>
+  <p:clrMapOvr>
+    <a:masterClrMapping/>
+  </p:clrMapOvr>
+</p:sld>
+</file>
+
+<file path=ppt/slides/slide3.xml><?xml version="1.0" encoding="utf-8"?>
+<p:sld xmlns:a="http://schemas.openxmlformats.org/drawingml/2006/main" xmlns:r="http://schemas.openxmlformats.org/officeDocument/2006/relationships" xmlns:p="http://schemas.openxmlformats.org/presentationml/2006/main">
+  <p:cSld>
+    <p:spTree>
+      <p:nvGrpSpPr>
+        <p:cNvPr id="1" name=""/>
+        <p:cNvGrpSpPr/>
+        <p:nvPr/>
+      </p:nvGrpSpPr>
+      <p:grpSpPr>
+        <a:xfrm>
+          <a:off x="0" y="0"/>
+          <a:ext cx="0" cy="0"/>
+          <a:chOff x="0" y="0"/>
+          <a:chExt cx="0" cy="0"/>
+        </a:xfrm>
+      </p:grpSpPr>
+      <p:sp>
+        <p:nvSpPr>
+          <p:cNvPr id="2" name="TextBox2"/>
+          <p:cNvSpPr txBox="1">
+            <a:spLocks noChangeArrowheads="1"/>
+          </p:cNvSpPr>
+          <p:nvPr/>
+        </p:nvSpPr>
+        <p:spPr>
+          <a:xfrm rot="0">
+            <a:off x="635000" y="635000"/>
+            <a:ext cx="7620000" cy="635000"/>
+          </a:xfrm>
+          <a:prstGeom prst="rect">
+            <a:avLst/>
+          </a:prstGeom>
+          <a:ln>
+            <a:headEnd type="none"/>
+            <a:tailEnd type="none"/>
+          </a:ln>
+        </p:spPr>
+        <p:txBody>
+          <a:bodyPr wrap="square">
+            <a:spAutoFit/>
+          </a:bodyPr>
+          <a:lstStyle/>
+          <a:p>
+            <a:pPr defTabSz="914400"/>
+            <a:r>
+              <a:rPr sz="2800" b="1" i="0" dirty="0">
+                <a:solidFill>
+                  <a:srgbClr val="000000">
+                    <a:alpha val="100000"/>
+                  </a:srgbClr>
+                </a:solidFill>
+              </a:rPr>
+              <a:t>Book</a:t>
+            </a:r>
+          </a:p>
+        </p:txBody>
+      </p:sp>
+      <p:sp>
+        <p:nvSpPr>
+          <p:cNvPr id="3" name="TextBox3"/>
+          <p:cNvSpPr txBox="1">
+            <a:spLocks noChangeArrowheads="1"/>
+          </p:cNvSpPr>
+          <p:nvPr/>
+        </p:nvSpPr>
+        <p:spPr>
+          <a:xfrm rot="0">
+            <a:off x="635000" y="1270000"/>
+            <a:ext cx="7620000" cy="635000"/>
+          </a:xfrm>
+          <a:prstGeom prst="rect">
+            <a:avLst/>
+          </a:prstGeom>
+          <a:ln>
+            <a:headEnd type="none"/>
+            <a:tailEnd type="none"/>
+          </a:ln>
+        </p:spPr>
+        <p:txBody>
+          <a:bodyPr wrap="square">
+            <a:spAutoFit/>
+          </a:bodyPr>
+          <a:lstStyle/>
+          <a:p>
+            <a:pPr defTabSz="914400"/>
+            <a:r>
+              <a:rPr sz="1800" b="0" i="0" dirty="0">
+                <a:solidFill>
+                  <a:srgbClr val="00E346">
+                    <a:alpha val="100000"/>
+                  </a:srgbClr>
+                </a:solidFill>
+              </a:rPr>
+              <a:t>Id: 85</a:t>
+            </a:r>
+          </a:p>
+        </p:txBody>
+      </p:sp>
+      <p:sp>
+        <p:nvSpPr>
+          <p:cNvPr id="4" name="TextBox4"/>
+          <p:cNvSpPr txBox="1">
+            <a:spLocks noChangeArrowheads="1"/>
+          </p:cNvSpPr>
+          <p:nvPr/>
+        </p:nvSpPr>
+        <p:spPr>
+          <a:xfrm rot="0">
+            <a:off x="635000" y="1905000"/>
+            <a:ext cx="7620000" cy="635000"/>
+          </a:xfrm>
+          <a:prstGeom prst="rect">
+            <a:avLst/>
+          </a:prstGeom>
+          <a:ln>
+            <a:headEnd type="none"/>
+            <a:tailEnd type="none"/>
+          </a:ln>
+        </p:spPr>
+        <p:txBody>
+          <a:bodyPr wrap="square">
+            <a:spAutoFit/>
+          </a:bodyPr>
+          <a:lstStyle/>
+          <a:p>
+            <a:pPr defTabSz="914400"/>
+            <a:r>
+              <a:rPr sz="2400" b="1" i="0" dirty="0">
+                <a:solidFill>
+                  <a:srgbClr val="000000">
+                    <a:alpha val="100000"/>
+                  </a:srgbClr>
+                </a:solidFill>
+              </a:rPr>
+              <a:t>Title: Test</a:t>
+            </a:r>
+          </a:p>
+        </p:txBody>
+      </p:sp>
+      <p:sp>
+        <p:nvSpPr>
+          <p:cNvPr id="5" name="TextBox5"/>
+          <p:cNvSpPr txBox="1">
+            <a:spLocks noChangeArrowheads="1"/>
+          </p:cNvSpPr>
+          <p:nvPr/>
+        </p:nvSpPr>
+        <p:spPr>
+          <a:xfrm rot="0">
+            <a:off x="635000" y="2540000"/>
+            <a:ext cx="7620000" cy="635000"/>
+          </a:xfrm>
+          <a:prstGeom prst="rect">
+            <a:avLst/>
+          </a:prstGeom>
+          <a:ln>
+            <a:headEnd type="none"/>
+            <a:tailEnd type="none"/>
+          </a:ln>
+        </p:spPr>
+        <p:txBody>
+          <a:bodyPr wrap="square">
+            <a:spAutoFit/>
+          </a:bodyPr>
+          <a:lstStyle/>
+          <a:p>
+            <a:pPr defTabSz="914400"/>
+            <a:r>
+              <a:rPr sz="1800" b="0" i="0" dirty="0">
+                <a:solidFill>
+                  <a:srgbClr val="000000">
+                    <a:alpha val="100000"/>
+                  </a:srgbClr>
+                </a:solidFill>
+              </a:rPr>
+              <a:t>Description: Test</a:t>
+            </a:r>
+          </a:p>
+        </p:txBody>
+      </p:sp>
+      <p:sp>
+        <p:nvSpPr>
+          <p:cNvPr id="6" name="TextBox6"/>
+          <p:cNvSpPr txBox="1">
+            <a:spLocks noChangeArrowheads="1"/>
+          </p:cNvSpPr>
+          <p:nvPr/>
+        </p:nvSpPr>
+        <p:spPr>
+          <a:xfrm rot="0">
+            <a:off x="635000" y="3175000"/>
+            <a:ext cx="7620000" cy="635000"/>
+          </a:xfrm>
+          <a:prstGeom prst="rect">
+            <a:avLst/>
+          </a:prstGeom>
+          <a:ln>
+            <a:headEnd type="none"/>
+            <a:tailEnd type="none"/>
+          </a:ln>
+        </p:spPr>
+        <p:txBody>
+          <a:bodyPr wrap="square">
+            <a:spAutoFit/>
+          </a:bodyPr>
+          <a:lstStyle/>
+          <a:p>
+            <a:pPr defTabSz="914400"/>
+            <a:r>
+              <a:rPr sz="1800" b="0" i="0" dirty="0">
+                <a:solidFill>
+                  <a:srgbClr val="000000">
+                    <a:alpha val="100000"/>
+                  </a:srgbClr>
+                </a:solidFill>
+                <a:hlinkClick r:id="rId2" action="ppaction://hlinkfile"/>
+              </a:rPr>
+              <a:t>ImageUrl: Test</a:t>
+            </a:r>
+          </a:p>
+        </p:txBody>
+      </p:sp>
+      <p:sp>
+        <p:nvSpPr>
+          <p:cNvPr id="7" name="SyncfusionLicense"/>
+          <p:cNvSpPr txBox="1">
+            <a:spLocks noChangeArrowheads="1"/>
+          </p:cNvSpPr>
+          <p:nvPr/>
+        </p:nvSpPr>
+        <p:spPr>
+          <a:xfrm rot="0">
+            <a:off x="0" y="5715000"/>
+            <a:ext cx="12192000" cy="1143000"/>
+          </a:xfrm>
+          <a:prstGeom prst="rect">
+            <a:avLst/>
+          </a:prstGeom>
+          <a:solidFill>
+            <a:srgbClr val="FFFFFF"/>
+          </a:solidFill>
+          <a:ln>
+            <a:headEnd type="none"/>
+            <a:tailEnd type="none"/>
+          </a:ln>
+        </p:spPr>
+        <p:txBody>
+          <a:bodyPr anchor="ctr" wrap="square">
+            <a:spAutoFit/>
+          </a:bodyPr>
+          <a:lstStyle/>
+          <a:p>
+            <a:pPr algn="ctr" defTabSz="914400">
+              <a:defRPr sz="1800" dirty="0">
+                <a:solidFill>
+                  <a:srgbClr val="FF0000"/>
+                </a:solidFill>
+              </a:defRPr>
+            </a:pPr>
+            <a:r>
+              <a:rPr/>
+              <a:t>Created with a trial version of Syncfusion PowerPoint library or registered the wrong key in your application. Click </a:t>
+            </a:r>
+            <a:r>
+              <a:rPr dirty="0">
+                <a:solidFill>
+                  <a:srgbClr val="0000FF"/>
+                </a:solidFill>
+                <a:hlinkClick r:id="rId3" action="ppaction://hlinkfile">
+                  <a:extLst>
+                    <a:ext uri="{A12FA001-AC4F-418D-AE19-62706E023703}">
+                      <ahyp:hlinkClr xmlns:ahyp="http://schemas.microsoft.com/office/drawing/2018/hyperlinkcolor" val="tx"/>
+                    </a:ext>
+                  </a:extLst>
+                </a:hlinkClick>
+              </a:rPr>
+              <a:t>here</a:t>
+            </a:r>
+            <a:r>
+              <a:rPr/>
+              <a:t> to obtain the valid key.</a:t>
             </a:r>
           </a:p>
         </p:txBody>

</xml_diff>